<commit_message>
main changes in Präsi
</commit_message>
<xml_diff>
--- a/Presentation/Smart_Toilet.pptx
+++ b/Presentation/Smart_Toilet.pptx
@@ -5,10 +5,10 @@
     <p:sldMasterId id="2147483724" r:id="rId1"/>
   </p:sldMasterIdLst>
   <p:notesMasterIdLst>
-    <p:notesMasterId r:id="rId12"/>
+    <p:notesMasterId r:id="rId15"/>
   </p:notesMasterIdLst>
   <p:handoutMasterIdLst>
-    <p:handoutMasterId r:id="rId13"/>
+    <p:handoutMasterId r:id="rId16"/>
   </p:handoutMasterIdLst>
   <p:sldIdLst>
     <p:sldId id="256" r:id="rId2"/>
@@ -17,10 +17,13 @@
     <p:sldId id="258" r:id="rId5"/>
     <p:sldId id="259" r:id="rId6"/>
     <p:sldId id="260" r:id="rId7"/>
-    <p:sldId id="261" r:id="rId8"/>
-    <p:sldId id="263" r:id="rId9"/>
-    <p:sldId id="264" r:id="rId10"/>
-    <p:sldId id="265" r:id="rId11"/>
+    <p:sldId id="263" r:id="rId8"/>
+    <p:sldId id="264" r:id="rId9"/>
+    <p:sldId id="265" r:id="rId10"/>
+    <p:sldId id="266" r:id="rId11"/>
+    <p:sldId id="269" r:id="rId12"/>
+    <p:sldId id="268" r:id="rId13"/>
+    <p:sldId id="270" r:id="rId14"/>
   </p:sldIdLst>
   <p:sldSz cx="9144000" cy="6858000" type="screen4x3"/>
   <p:notesSz cx="6858000" cy="9144000"/>
@@ -265,7 +268,7 @@
           <a:p>
             <a:fld id="{0389A364-0348-2F43-99DF-D2B200CF0081}" type="datetimeFigureOut">
               <a:rPr lang="de-DE" smtClean="0"/>
-              <a:t>08.06.2025</a:t>
+              <a:t>12.06.2025</a:t>
             </a:fld>
             <a:endParaRPr lang="de-DE"/>
           </a:p>
@@ -431,7 +434,7 @@
           <a:p>
             <a:fld id="{7A19BEE0-598C-4858-A439-753E34679212}" type="datetimeFigureOut">
               <a:rPr lang="de-AT" smtClean="0"/>
-              <a:t>08.06.2025</a:t>
+              <a:t>11.06.2025</a:t>
             </a:fld>
             <a:endParaRPr lang="de-AT"/>
           </a:p>
@@ -698,6 +701,94 @@
     </a:lvl9pPr>
   </p:notesStyle>
 </p:notesMaster>
+</file>
+
+<file path=ppt/notesSlides/notesSlide1.xml><?xml version="1.0" encoding="utf-8"?>
+<p:notes xmlns:a="http://schemas.openxmlformats.org/drawingml/2006/main" xmlns:r="http://schemas.openxmlformats.org/officeDocument/2006/relationships" xmlns:p="http://schemas.openxmlformats.org/presentationml/2006/main">
+  <p:cSld>
+    <p:spTree>
+      <p:nvGrpSpPr>
+        <p:cNvPr id="1" name=""/>
+        <p:cNvGrpSpPr/>
+        <p:nvPr/>
+      </p:nvGrpSpPr>
+      <p:grpSpPr>
+        <a:xfrm>
+          <a:off x="0" y="0"/>
+          <a:ext cx="0" cy="0"/>
+          <a:chOff x="0" y="0"/>
+          <a:chExt cx="0" cy="0"/>
+        </a:xfrm>
+      </p:grpSpPr>
+      <p:sp>
+        <p:nvSpPr>
+          <p:cNvPr id="2" name="Folienbildplatzhalter 1"/>
+          <p:cNvSpPr>
+            <a:spLocks noGrp="1" noRot="1" noChangeAspect="1"/>
+          </p:cNvSpPr>
+          <p:nvPr>
+            <p:ph type="sldImg"/>
+          </p:nvPr>
+        </p:nvSpPr>
+        <p:spPr/>
+      </p:sp>
+      <p:sp>
+        <p:nvSpPr>
+          <p:cNvPr id="3" name="Notizenplatzhalter 2"/>
+          <p:cNvSpPr>
+            <a:spLocks noGrp="1"/>
+          </p:cNvSpPr>
+          <p:nvPr>
+            <p:ph type="body" idx="1"/>
+          </p:nvPr>
+        </p:nvSpPr>
+        <p:spPr/>
+        <p:txBody>
+          <a:bodyPr/>
+          <a:lstStyle/>
+          <a:p>
+            <a:r>
+              <a:rPr lang="de-AT" dirty="0" err="1"/>
+              <a:t>RandomForestClassifier</a:t>
+            </a:r>
+            <a:endParaRPr lang="de-AT" dirty="0"/>
+          </a:p>
+        </p:txBody>
+      </p:sp>
+      <p:sp>
+        <p:nvSpPr>
+          <p:cNvPr id="4" name="Foliennummernplatzhalter 3"/>
+          <p:cNvSpPr>
+            <a:spLocks noGrp="1"/>
+          </p:cNvSpPr>
+          <p:nvPr>
+            <p:ph type="sldNum" sz="quarter" idx="5"/>
+          </p:nvPr>
+        </p:nvSpPr>
+        <p:spPr/>
+        <p:txBody>
+          <a:bodyPr/>
+          <a:lstStyle/>
+          <a:p>
+            <a:fld id="{2AFEA223-4F50-4DD6-9CC4-15E4F51256E0}" type="slidenum">
+              <a:rPr lang="de-AT" smtClean="0"/>
+              <a:t>8</a:t>
+            </a:fld>
+            <a:endParaRPr lang="de-AT"/>
+          </a:p>
+        </p:txBody>
+      </p:sp>
+    </p:spTree>
+    <p:extLst>
+      <p:ext uri="{BB962C8B-B14F-4D97-AF65-F5344CB8AC3E}">
+        <p14:creationId xmlns:p14="http://schemas.microsoft.com/office/powerpoint/2010/main" val="79172322"/>
+      </p:ext>
+    </p:extLst>
+  </p:cSld>
+  <p:clrMapOvr>
+    <a:masterClrMapping/>
+  </p:clrMapOvr>
+</p:notes>
 </file>
 
 <file path=ppt/slideLayouts/slideLayout1.xml><?xml version="1.0" encoding="utf-8"?>
@@ -5509,7 +5600,7 @@
           <p:cNvPr id="2" name="Titel 1">
             <a:extLst>
               <a:ext uri="{FF2B5EF4-FFF2-40B4-BE49-F238E27FC236}">
-                <a16:creationId xmlns:a16="http://schemas.microsoft.com/office/drawing/2014/main" id="{C0FB48FF-6082-88A4-01BB-C5CB53098AB6}"/>
+                <a16:creationId xmlns:a16="http://schemas.microsoft.com/office/drawing/2014/main" id="{0DB5C6F3-6B8C-0750-5D9D-9C4E52FDB1F6}"/>
               </a:ext>
             </a:extLst>
           </p:cNvPr>
@@ -5525,32 +5616,10 @@
           <a:bodyPr/>
           <a:lstStyle/>
           <a:p>
-            <a:endParaRPr lang="de-AT" dirty="0"/>
-          </a:p>
-        </p:txBody>
-      </p:sp>
-      <p:sp>
-        <p:nvSpPr>
-          <p:cNvPr id="3" name="Inhaltsplatzhalter 2">
-            <a:extLst>
-              <a:ext uri="{FF2B5EF4-FFF2-40B4-BE49-F238E27FC236}">
-                <a16:creationId xmlns:a16="http://schemas.microsoft.com/office/drawing/2014/main" id="{E86B7CCE-DEEB-AEDE-901A-33C4BB0C90AF}"/>
-              </a:ext>
-            </a:extLst>
-          </p:cNvPr>
-          <p:cNvSpPr>
-            <a:spLocks noGrp="1"/>
-          </p:cNvSpPr>
-          <p:nvPr>
-            <p:ph idx="1"/>
-          </p:nvPr>
-        </p:nvSpPr>
-        <p:spPr/>
-        <p:txBody>
-          <a:bodyPr/>
-          <a:lstStyle/>
-          <a:p>
-            <a:endParaRPr lang="de-AT" dirty="0"/>
+            <a:r>
+              <a:rPr lang="de-AT" dirty="0"/>
+              <a:t>SQL</a:t>
+            </a:r>
           </a:p>
         </p:txBody>
       </p:sp>
@@ -5559,7 +5628,7 @@
           <p:cNvPr id="4" name="Foliennummernplatzhalter 3">
             <a:extLst>
               <a:ext uri="{FF2B5EF4-FFF2-40B4-BE49-F238E27FC236}">
-                <a16:creationId xmlns:a16="http://schemas.microsoft.com/office/drawing/2014/main" id="{51A2DE25-317D-0799-9020-0FCA398BE531}"/>
+                <a16:creationId xmlns:a16="http://schemas.microsoft.com/office/drawing/2014/main" id="{40F3DE37-C539-36C3-FA55-237AD15EE62E}"/>
               </a:ext>
             </a:extLst>
           </p:cNvPr>
@@ -5584,10 +5653,531 @@
           </a:p>
         </p:txBody>
       </p:sp>
+      <p:sp>
+        <p:nvSpPr>
+          <p:cNvPr id="8" name="Inhaltsplatzhalter 7">
+            <a:extLst>
+              <a:ext uri="{FF2B5EF4-FFF2-40B4-BE49-F238E27FC236}">
+                <a16:creationId xmlns:a16="http://schemas.microsoft.com/office/drawing/2014/main" id="{23B730EA-21CC-DB25-E30E-7D87CFEC79F0}"/>
+              </a:ext>
+            </a:extLst>
+          </p:cNvPr>
+          <p:cNvSpPr>
+            <a:spLocks noGrp="1"/>
+          </p:cNvSpPr>
+          <p:nvPr>
+            <p:ph idx="1"/>
+          </p:nvPr>
+        </p:nvSpPr>
+        <p:spPr>
+          <a:xfrm>
+            <a:off x="267904" y="2344057"/>
+            <a:ext cx="8604251" cy="3748768"/>
+          </a:xfrm>
+        </p:spPr>
+        <p:txBody>
+          <a:bodyPr>
+            <a:normAutofit/>
+          </a:bodyPr>
+          <a:lstStyle/>
+          <a:p>
+            <a:pPr marL="457200" indent="-457200">
+              <a:buFont typeface="Arial" panose="020B0604020202020204" pitchFamily="34" charset="0"/>
+              <a:buChar char="•"/>
+            </a:pPr>
+            <a:r>
+              <a:rPr lang="de-AT" sz="2400" dirty="0" err="1"/>
+              <a:t>Tables</a:t>
+            </a:r>
+            <a:endParaRPr lang="de-AT" sz="2400" dirty="0"/>
+          </a:p>
+          <a:p>
+            <a:pPr marL="457200" indent="-457200">
+              <a:buFont typeface="Arial" panose="020B0604020202020204" pitchFamily="34" charset="0"/>
+              <a:buChar char="•"/>
+            </a:pPr>
+            <a:r>
+              <a:rPr lang="de-AT" sz="2400" dirty="0"/>
+              <a:t>Insert </a:t>
+            </a:r>
+            <a:r>
+              <a:rPr lang="de-AT" sz="2400" dirty="0" err="1"/>
+              <a:t>data</a:t>
+            </a:r>
+            <a:endParaRPr lang="de-AT" sz="2400" dirty="0"/>
+          </a:p>
+          <a:p>
+            <a:pPr marL="457200" indent="-457200">
+              <a:buFont typeface="Arial" panose="020B0604020202020204" pitchFamily="34" charset="0"/>
+              <a:buChar char="•"/>
+            </a:pPr>
+            <a:r>
+              <a:rPr lang="de-AT" sz="2400" dirty="0"/>
+              <a:t>SQL-Diagramm</a:t>
+            </a:r>
+          </a:p>
+          <a:p>
+            <a:pPr marL="457200" indent="-457200">
+              <a:buFont typeface="Arial" panose="020B0604020202020204" pitchFamily="34" charset="0"/>
+              <a:buChar char="•"/>
+            </a:pPr>
+            <a:r>
+              <a:rPr lang="de-AT" sz="2400" dirty="0"/>
+              <a:t>SQL-</a:t>
+            </a:r>
+            <a:r>
+              <a:rPr lang="de-AT" sz="2400" dirty="0" err="1"/>
+              <a:t>Queries</a:t>
+            </a:r>
+            <a:endParaRPr lang="de-AT" sz="2400" dirty="0"/>
+          </a:p>
+          <a:p>
+            <a:pPr marL="457200" indent="-457200">
+              <a:buFont typeface="Arial" panose="020B0604020202020204" pitchFamily="34" charset="0"/>
+              <a:buChar char="•"/>
+            </a:pPr>
+            <a:endParaRPr lang="de-AT" sz="2400" dirty="0"/>
+          </a:p>
+        </p:txBody>
+      </p:sp>
     </p:spTree>
     <p:extLst>
       <p:ext uri="{BB962C8B-B14F-4D97-AF65-F5344CB8AC3E}">
-        <p14:creationId xmlns:p14="http://schemas.microsoft.com/office/powerpoint/2010/main" val="3319517710"/>
+        <p14:creationId xmlns:p14="http://schemas.microsoft.com/office/powerpoint/2010/main" val="2708177614"/>
+      </p:ext>
+    </p:extLst>
+  </p:cSld>
+  <p:clrMapOvr>
+    <a:masterClrMapping/>
+  </p:clrMapOvr>
+</p:sld>
+</file>
+
+<file path=ppt/slides/slide11.xml><?xml version="1.0" encoding="utf-8"?>
+<p:sld xmlns:a="http://schemas.openxmlformats.org/drawingml/2006/main" xmlns:r="http://schemas.openxmlformats.org/officeDocument/2006/relationships" xmlns:p="http://schemas.openxmlformats.org/presentationml/2006/main">
+  <p:cSld>
+    <p:spTree>
+      <p:nvGrpSpPr>
+        <p:cNvPr id="1" name=""/>
+        <p:cNvGrpSpPr/>
+        <p:nvPr/>
+      </p:nvGrpSpPr>
+      <p:grpSpPr>
+        <a:xfrm>
+          <a:off x="0" y="0"/>
+          <a:ext cx="0" cy="0"/>
+          <a:chOff x="0" y="0"/>
+          <a:chExt cx="0" cy="0"/>
+        </a:xfrm>
+      </p:grpSpPr>
+      <p:pic>
+        <p:nvPicPr>
+          <p:cNvPr id="6" name="Inhaltsplatzhalter 5">
+            <a:extLst>
+              <a:ext uri="{FF2B5EF4-FFF2-40B4-BE49-F238E27FC236}">
+                <a16:creationId xmlns:a16="http://schemas.microsoft.com/office/drawing/2014/main" id="{A4D89BD4-E673-038E-9FA3-02AFE5E4FAC6}"/>
+              </a:ext>
+            </a:extLst>
+          </p:cNvPr>
+          <p:cNvPicPr>
+            <a:picLocks noGrp="1" noChangeAspect="1"/>
+          </p:cNvPicPr>
+          <p:nvPr>
+            <p:ph idx="1"/>
+          </p:nvPr>
+        </p:nvPicPr>
+        <p:blipFill>
+          <a:blip r:embed="rId2"/>
+          <a:stretch>
+            <a:fillRect/>
+          </a:stretch>
+        </p:blipFill>
+        <p:spPr>
+          <a:xfrm>
+            <a:off x="2045613" y="1372383"/>
+            <a:ext cx="5052774" cy="4313640"/>
+          </a:xfrm>
+        </p:spPr>
+      </p:pic>
+      <p:sp>
+        <p:nvSpPr>
+          <p:cNvPr id="4" name="Foliennummernplatzhalter 3">
+            <a:extLst>
+              <a:ext uri="{FF2B5EF4-FFF2-40B4-BE49-F238E27FC236}">
+                <a16:creationId xmlns:a16="http://schemas.microsoft.com/office/drawing/2014/main" id="{8497CB6D-C4DF-F658-2D52-32394A04CDD7}"/>
+              </a:ext>
+            </a:extLst>
+          </p:cNvPr>
+          <p:cNvSpPr>
+            <a:spLocks noGrp="1"/>
+          </p:cNvSpPr>
+          <p:nvPr>
+            <p:ph type="sldNum" sz="quarter" idx="12"/>
+          </p:nvPr>
+        </p:nvSpPr>
+        <p:spPr/>
+        <p:txBody>
+          <a:bodyPr/>
+          <a:lstStyle/>
+          <a:p>
+            <a:fld id="{E68C68F6-CEB4-C040-B3A3-CADDD499EB7C}" type="slidenum">
+              <a:rPr lang="de-DE" smtClean="0"/>
+              <a:pPr/>
+              <a:t>11</a:t>
+            </a:fld>
+            <a:endParaRPr lang="de-DE" dirty="0"/>
+          </a:p>
+        </p:txBody>
+      </p:sp>
+    </p:spTree>
+    <p:extLst>
+      <p:ext uri="{BB962C8B-B14F-4D97-AF65-F5344CB8AC3E}">
+        <p14:creationId xmlns:p14="http://schemas.microsoft.com/office/powerpoint/2010/main" val="629175102"/>
+      </p:ext>
+    </p:extLst>
+  </p:cSld>
+  <p:clrMapOvr>
+    <a:masterClrMapping/>
+  </p:clrMapOvr>
+</p:sld>
+</file>
+
+<file path=ppt/slides/slide12.xml><?xml version="1.0" encoding="utf-8"?>
+<p:sld xmlns:a="http://schemas.openxmlformats.org/drawingml/2006/main" xmlns:r="http://schemas.openxmlformats.org/officeDocument/2006/relationships" xmlns:p="http://schemas.openxmlformats.org/presentationml/2006/main">
+  <p:cSld>
+    <p:spTree>
+      <p:nvGrpSpPr>
+        <p:cNvPr id="1" name=""/>
+        <p:cNvGrpSpPr/>
+        <p:nvPr/>
+      </p:nvGrpSpPr>
+      <p:grpSpPr>
+        <a:xfrm>
+          <a:off x="0" y="0"/>
+          <a:ext cx="0" cy="0"/>
+          <a:chOff x="0" y="0"/>
+          <a:chExt cx="0" cy="0"/>
+        </a:xfrm>
+      </p:grpSpPr>
+      <p:sp>
+        <p:nvSpPr>
+          <p:cNvPr id="4" name="Foliennummernplatzhalter 3">
+            <a:extLst>
+              <a:ext uri="{FF2B5EF4-FFF2-40B4-BE49-F238E27FC236}">
+                <a16:creationId xmlns:a16="http://schemas.microsoft.com/office/drawing/2014/main" id="{AE466762-E095-7F84-2830-7A7FAB0EFDC2}"/>
+              </a:ext>
+            </a:extLst>
+          </p:cNvPr>
+          <p:cNvSpPr>
+            <a:spLocks noGrp="1"/>
+          </p:cNvSpPr>
+          <p:nvPr>
+            <p:ph type="sldNum" sz="quarter" idx="12"/>
+          </p:nvPr>
+        </p:nvSpPr>
+        <p:spPr/>
+        <p:txBody>
+          <a:bodyPr/>
+          <a:lstStyle/>
+          <a:p>
+            <a:fld id="{E68C68F6-CEB4-C040-B3A3-CADDD499EB7C}" type="slidenum">
+              <a:rPr lang="de-DE" smtClean="0"/>
+              <a:pPr/>
+              <a:t>12</a:t>
+            </a:fld>
+            <a:endParaRPr lang="de-DE" dirty="0"/>
+          </a:p>
+        </p:txBody>
+      </p:sp>
+      <p:pic>
+        <p:nvPicPr>
+          <p:cNvPr id="6" name="Grafik 5">
+            <a:extLst>
+              <a:ext uri="{FF2B5EF4-FFF2-40B4-BE49-F238E27FC236}">
+                <a16:creationId xmlns:a16="http://schemas.microsoft.com/office/drawing/2014/main" id="{1F5453BD-B286-6740-7A89-832D3C8DCBDD}"/>
+              </a:ext>
+            </a:extLst>
+          </p:cNvPr>
+          <p:cNvPicPr>
+            <a:picLocks noChangeAspect="1"/>
+          </p:cNvPicPr>
+          <p:nvPr/>
+        </p:nvPicPr>
+        <p:blipFill>
+          <a:blip r:embed="rId2"/>
+          <a:stretch>
+            <a:fillRect/>
+          </a:stretch>
+        </p:blipFill>
+        <p:spPr>
+          <a:xfrm>
+            <a:off x="3916915" y="3183577"/>
+            <a:ext cx="4364201" cy="962001"/>
+          </a:xfrm>
+          <a:prstGeom prst="rect">
+            <a:avLst/>
+          </a:prstGeom>
+        </p:spPr>
+      </p:pic>
+      <p:pic>
+        <p:nvPicPr>
+          <p:cNvPr id="8" name="Grafik 7">
+            <a:extLst>
+              <a:ext uri="{FF2B5EF4-FFF2-40B4-BE49-F238E27FC236}">
+                <a16:creationId xmlns:a16="http://schemas.microsoft.com/office/drawing/2014/main" id="{89E2BD34-27DD-FECB-1FAC-858AEB1B3D24}"/>
+              </a:ext>
+            </a:extLst>
+          </p:cNvPr>
+          <p:cNvPicPr>
+            <a:picLocks noChangeAspect="1"/>
+          </p:cNvPicPr>
+          <p:nvPr/>
+        </p:nvPicPr>
+        <p:blipFill>
+          <a:blip r:embed="rId3"/>
+          <a:stretch>
+            <a:fillRect/>
+          </a:stretch>
+        </p:blipFill>
+        <p:spPr>
+          <a:xfrm>
+            <a:off x="733190" y="1555635"/>
+            <a:ext cx="3937827" cy="1199392"/>
+          </a:xfrm>
+          <a:prstGeom prst="rect">
+            <a:avLst/>
+          </a:prstGeom>
+        </p:spPr>
+      </p:pic>
+      <p:pic>
+        <p:nvPicPr>
+          <p:cNvPr id="10" name="Grafik 9">
+            <a:extLst>
+              <a:ext uri="{FF2B5EF4-FFF2-40B4-BE49-F238E27FC236}">
+                <a16:creationId xmlns:a16="http://schemas.microsoft.com/office/drawing/2014/main" id="{4030F27E-BB3C-B064-9410-49B40337548B}"/>
+              </a:ext>
+            </a:extLst>
+          </p:cNvPr>
+          <p:cNvPicPr>
+            <a:picLocks noChangeAspect="1"/>
+          </p:cNvPicPr>
+          <p:nvPr/>
+        </p:nvPicPr>
+        <p:blipFill>
+          <a:blip r:embed="rId4"/>
+          <a:stretch>
+            <a:fillRect/>
+          </a:stretch>
+        </p:blipFill>
+        <p:spPr>
+          <a:xfrm>
+            <a:off x="1511490" y="4574128"/>
+            <a:ext cx="5227065" cy="1043387"/>
+          </a:xfrm>
+          <a:prstGeom prst="rect">
+            <a:avLst/>
+          </a:prstGeom>
+        </p:spPr>
+      </p:pic>
+    </p:spTree>
+    <p:extLst>
+      <p:ext uri="{BB962C8B-B14F-4D97-AF65-F5344CB8AC3E}">
+        <p14:creationId xmlns:p14="http://schemas.microsoft.com/office/powerpoint/2010/main" val="3807652022"/>
+      </p:ext>
+    </p:extLst>
+  </p:cSld>
+  <p:clrMapOvr>
+    <a:masterClrMapping/>
+  </p:clrMapOvr>
+</p:sld>
+</file>
+
+<file path=ppt/slides/slide13.xml><?xml version="1.0" encoding="utf-8"?>
+<p:sld xmlns:a="http://schemas.openxmlformats.org/drawingml/2006/main" xmlns:r="http://schemas.openxmlformats.org/officeDocument/2006/relationships" xmlns:p="http://schemas.openxmlformats.org/presentationml/2006/main">
+  <p:cSld>
+    <p:spTree>
+      <p:nvGrpSpPr>
+        <p:cNvPr id="1" name=""/>
+        <p:cNvGrpSpPr/>
+        <p:nvPr/>
+      </p:nvGrpSpPr>
+      <p:grpSpPr>
+        <a:xfrm>
+          <a:off x="0" y="0"/>
+          <a:ext cx="0" cy="0"/>
+          <a:chOff x="0" y="0"/>
+          <a:chExt cx="0" cy="0"/>
+        </a:xfrm>
+      </p:grpSpPr>
+      <p:sp>
+        <p:nvSpPr>
+          <p:cNvPr id="3" name="Inhaltsplatzhalter 2">
+            <a:extLst>
+              <a:ext uri="{FF2B5EF4-FFF2-40B4-BE49-F238E27FC236}">
+                <a16:creationId xmlns:a16="http://schemas.microsoft.com/office/drawing/2014/main" id="{A4115391-6BD7-098D-8B4C-6BD6EE5696C7}"/>
+              </a:ext>
+            </a:extLst>
+          </p:cNvPr>
+          <p:cNvSpPr>
+            <a:spLocks noGrp="1"/>
+          </p:cNvSpPr>
+          <p:nvPr>
+            <p:ph idx="1"/>
+          </p:nvPr>
+        </p:nvSpPr>
+        <p:spPr/>
+        <p:txBody>
+          <a:bodyPr/>
+          <a:lstStyle/>
+          <a:p>
+            <a:pPr algn="ctr"/>
+            <a:r>
+              <a:rPr lang="de-AT" dirty="0"/>
+              <a:t>„</a:t>
+            </a:r>
+            <a:r>
+              <a:rPr lang="de-AT" dirty="0" err="1"/>
+              <a:t>Why</a:t>
+            </a:r>
+            <a:r>
+              <a:rPr lang="de-AT" dirty="0"/>
+              <a:t> </a:t>
+            </a:r>
+            <a:r>
+              <a:rPr lang="de-AT" dirty="0" err="1"/>
+              <a:t>settle</a:t>
+            </a:r>
+            <a:r>
+              <a:rPr lang="de-AT" dirty="0"/>
+              <a:t> </a:t>
+            </a:r>
+            <a:r>
+              <a:rPr lang="de-AT" dirty="0" err="1"/>
+              <a:t>for</a:t>
+            </a:r>
+            <a:r>
+              <a:rPr lang="de-AT" dirty="0"/>
+              <a:t> </a:t>
+            </a:r>
+            <a:r>
+              <a:rPr lang="de-AT" dirty="0" err="1"/>
+              <a:t>dumb</a:t>
+            </a:r>
+            <a:r>
+              <a:rPr lang="de-AT" dirty="0"/>
+              <a:t> </a:t>
+            </a:r>
+            <a:r>
+              <a:rPr lang="de-AT" dirty="0" err="1"/>
+              <a:t>toilets</a:t>
+            </a:r>
+            <a:r>
+              <a:rPr lang="de-AT" dirty="0"/>
+              <a:t> </a:t>
+            </a:r>
+            <a:r>
+              <a:rPr lang="de-AT" dirty="0" err="1"/>
+              <a:t>when</a:t>
+            </a:r>
+            <a:r>
+              <a:rPr lang="de-AT" dirty="0"/>
+              <a:t> </a:t>
+            </a:r>
+            <a:r>
+              <a:rPr lang="de-AT" dirty="0" err="1"/>
+              <a:t>you</a:t>
+            </a:r>
+            <a:r>
+              <a:rPr lang="de-AT" dirty="0"/>
+              <a:t> </a:t>
+            </a:r>
+            <a:r>
+              <a:rPr lang="de-AT" dirty="0" err="1"/>
+              <a:t>can</a:t>
+            </a:r>
+            <a:r>
+              <a:rPr lang="de-AT" dirty="0"/>
+              <a:t> sh*t (</a:t>
+            </a:r>
+            <a:r>
+              <a:rPr lang="de-AT" dirty="0" err="1"/>
+              <a:t>flush</a:t>
+            </a:r>
+            <a:r>
+              <a:rPr lang="de-AT" dirty="0"/>
+              <a:t>) </a:t>
+            </a:r>
+            <a:r>
+              <a:rPr lang="de-AT" dirty="0" err="1"/>
+              <a:t>with</a:t>
+            </a:r>
+            <a:r>
+              <a:rPr lang="de-AT" dirty="0"/>
+              <a:t> </a:t>
+            </a:r>
+            <a:r>
+              <a:rPr lang="de-AT" dirty="0" err="1"/>
+              <a:t>intelligence</a:t>
+            </a:r>
+            <a:r>
+              <a:rPr lang="de-AT" dirty="0"/>
+              <a:t>!“</a:t>
+            </a:r>
+          </a:p>
+          <a:p>
+            <a:pPr algn="ctr"/>
+            <a:r>
+              <a:rPr lang="de-AT" sz="1600" dirty="0"/>
+              <a:t>- </a:t>
+            </a:r>
+            <a:r>
+              <a:rPr lang="de-AT" sz="1600" dirty="0" err="1"/>
+              <a:t>Some</a:t>
+            </a:r>
+            <a:r>
+              <a:rPr lang="de-AT" sz="1600" dirty="0"/>
+              <a:t> AI</a:t>
+            </a:r>
+          </a:p>
+          <a:p>
+            <a:endParaRPr lang="de-AT" dirty="0"/>
+          </a:p>
+        </p:txBody>
+      </p:sp>
+      <p:sp>
+        <p:nvSpPr>
+          <p:cNvPr id="4" name="Foliennummernplatzhalter 3">
+            <a:extLst>
+              <a:ext uri="{FF2B5EF4-FFF2-40B4-BE49-F238E27FC236}">
+                <a16:creationId xmlns:a16="http://schemas.microsoft.com/office/drawing/2014/main" id="{63DE90D1-A4BB-B131-B067-895C7CFB7B60}"/>
+              </a:ext>
+            </a:extLst>
+          </p:cNvPr>
+          <p:cNvSpPr>
+            <a:spLocks noGrp="1"/>
+          </p:cNvSpPr>
+          <p:nvPr>
+            <p:ph type="sldNum" sz="quarter" idx="12"/>
+          </p:nvPr>
+        </p:nvSpPr>
+        <p:spPr/>
+        <p:txBody>
+          <a:bodyPr/>
+          <a:lstStyle/>
+          <a:p>
+            <a:fld id="{E68C68F6-CEB4-C040-B3A3-CADDD499EB7C}" type="slidenum">
+              <a:rPr lang="de-DE" smtClean="0"/>
+              <a:pPr/>
+              <a:t>13</a:t>
+            </a:fld>
+            <a:endParaRPr lang="de-DE" dirty="0"/>
+          </a:p>
+        </p:txBody>
+      </p:sp>
+    </p:spTree>
+    <p:extLst>
+      <p:ext uri="{BB962C8B-B14F-4D97-AF65-F5344CB8AC3E}">
+        <p14:creationId xmlns:p14="http://schemas.microsoft.com/office/powerpoint/2010/main" val="3930014594"/>
       </p:ext>
     </p:extLst>
   </p:cSld>
@@ -6203,7 +6793,9 @@
         </p:nvSpPr>
         <p:spPr/>
         <p:txBody>
-          <a:bodyPr/>
+          <a:bodyPr>
+            <a:normAutofit/>
+          </a:bodyPr>
           <a:lstStyle/>
           <a:p>
             <a:pPr marL="457200" indent="-457200">
@@ -6211,14 +6803,14 @@
               <a:buChar char="•"/>
             </a:pPr>
             <a:r>
-              <a:rPr lang="de-AT" dirty="0"/>
+              <a:rPr lang="de-AT" sz="2400" dirty="0"/>
               <a:t>Door </a:t>
             </a:r>
             <a:r>
-              <a:rPr lang="de-AT" dirty="0" err="1"/>
+              <a:rPr lang="de-AT" sz="2400" dirty="0" err="1"/>
               <a:t>Detection</a:t>
             </a:r>
-            <a:endParaRPr lang="de-AT" dirty="0"/>
+            <a:endParaRPr lang="de-AT" sz="2400" dirty="0"/>
           </a:p>
           <a:p>
             <a:pPr marL="457200" indent="-457200">
@@ -6226,14 +6818,14 @@
               <a:buChar char="•"/>
             </a:pPr>
             <a:r>
-              <a:rPr lang="de-AT" dirty="0"/>
+              <a:rPr lang="de-AT" sz="2400" dirty="0"/>
               <a:t>Light </a:t>
             </a:r>
             <a:r>
-              <a:rPr lang="de-AT" dirty="0" err="1"/>
+              <a:rPr lang="de-AT" sz="2400" dirty="0" err="1"/>
               <a:t>measurement</a:t>
             </a:r>
-            <a:endParaRPr lang="de-AT" dirty="0"/>
+            <a:endParaRPr lang="de-AT" sz="2400" dirty="0"/>
           </a:p>
           <a:p>
             <a:pPr marL="457200" indent="-457200">
@@ -6241,22 +6833,22 @@
               <a:buChar char="•"/>
             </a:pPr>
             <a:r>
-              <a:rPr lang="de-AT" dirty="0"/>
+              <a:rPr lang="de-AT" sz="2400" dirty="0"/>
               <a:t>Air </a:t>
             </a:r>
             <a:r>
-              <a:rPr lang="de-AT" dirty="0" err="1"/>
+              <a:rPr lang="de-AT" sz="2400" dirty="0" err="1"/>
               <a:t>quality</a:t>
             </a:r>
             <a:r>
-              <a:rPr lang="de-AT" dirty="0"/>
+              <a:rPr lang="de-AT" sz="2400" dirty="0"/>
               <a:t> </a:t>
             </a:r>
             <a:r>
-              <a:rPr lang="de-AT" dirty="0" err="1"/>
+              <a:rPr lang="de-AT" sz="2400" dirty="0" err="1"/>
               <a:t>readings</a:t>
             </a:r>
-            <a:endParaRPr lang="de-AT" dirty="0"/>
+            <a:endParaRPr lang="de-AT" sz="2400" dirty="0"/>
           </a:p>
         </p:txBody>
       </p:sp>
@@ -6410,8 +7002,8 @@
         </p:blipFill>
         <p:spPr>
           <a:xfrm>
-            <a:off x="267905" y="2833953"/>
-            <a:ext cx="8604250" cy="2039406"/>
+            <a:off x="613690" y="2917666"/>
+            <a:ext cx="7916619" cy="1876422"/>
           </a:xfrm>
         </p:spPr>
       </p:pic>
@@ -6595,12 +7187,42 @@
           </a:p>
         </p:txBody>
       </p:sp>
+      <p:sp>
+        <p:nvSpPr>
+          <p:cNvPr id="4" name="Foliennummernplatzhalter 3">
+            <a:extLst>
+              <a:ext uri="{FF2B5EF4-FFF2-40B4-BE49-F238E27FC236}">
+                <a16:creationId xmlns:a16="http://schemas.microsoft.com/office/drawing/2014/main" id="{27D7410C-9F49-7B9D-E384-235C4866F008}"/>
+              </a:ext>
+            </a:extLst>
+          </p:cNvPr>
+          <p:cNvSpPr>
+            <a:spLocks noGrp="1"/>
+          </p:cNvSpPr>
+          <p:nvPr>
+            <p:ph type="sldNum" sz="quarter" idx="12"/>
+          </p:nvPr>
+        </p:nvSpPr>
+        <p:spPr/>
+        <p:txBody>
+          <a:bodyPr/>
+          <a:lstStyle/>
+          <a:p>
+            <a:fld id="{E68C68F6-CEB4-C040-B3A3-CADDD499EB7C}" type="slidenum">
+              <a:rPr lang="de-DE" smtClean="0"/>
+              <a:pPr/>
+              <a:t>6</a:t>
+            </a:fld>
+            <a:endParaRPr lang="de-DE" dirty="0"/>
+          </a:p>
+        </p:txBody>
+      </p:sp>
       <p:pic>
         <p:nvPicPr>
-          <p:cNvPr id="6" name="Inhaltsplatzhalter 5">
+          <p:cNvPr id="8" name="Inhaltsplatzhalter 7">
             <a:extLst>
               <a:ext uri="{FF2B5EF4-FFF2-40B4-BE49-F238E27FC236}">
-                <a16:creationId xmlns:a16="http://schemas.microsoft.com/office/drawing/2014/main" id="{7427C971-D9B5-389B-CB09-1A19F8BF7CDC}"/>
+                <a16:creationId xmlns:a16="http://schemas.microsoft.com/office/drawing/2014/main" id="{47C41EE2-48A2-047B-A7CA-3DD6A4F6E3FC}"/>
               </a:ext>
             </a:extLst>
           </p:cNvPr>
@@ -6619,41 +7241,11 @@
         </p:blipFill>
         <p:spPr>
           <a:xfrm>
-            <a:off x="314490" y="2344738"/>
-            <a:ext cx="8515019" cy="3748087"/>
+            <a:off x="553791" y="2406784"/>
+            <a:ext cx="8036417" cy="3522390"/>
           </a:xfrm>
         </p:spPr>
       </p:pic>
-      <p:sp>
-        <p:nvSpPr>
-          <p:cNvPr id="4" name="Foliennummernplatzhalter 3">
-            <a:extLst>
-              <a:ext uri="{FF2B5EF4-FFF2-40B4-BE49-F238E27FC236}">
-                <a16:creationId xmlns:a16="http://schemas.microsoft.com/office/drawing/2014/main" id="{27D7410C-9F49-7B9D-E384-235C4866F008}"/>
-              </a:ext>
-            </a:extLst>
-          </p:cNvPr>
-          <p:cNvSpPr>
-            <a:spLocks noGrp="1"/>
-          </p:cNvSpPr>
-          <p:nvPr>
-            <p:ph type="sldNum" sz="quarter" idx="12"/>
-          </p:nvPr>
-        </p:nvSpPr>
-        <p:spPr/>
-        <p:txBody>
-          <a:bodyPr/>
-          <a:lstStyle/>
-          <a:p>
-            <a:fld id="{E68C68F6-CEB4-C040-B3A3-CADDD499EB7C}" type="slidenum">
-              <a:rPr lang="de-DE" smtClean="0"/>
-              <a:pPr/>
-              <a:t>6</a:t>
-            </a:fld>
-            <a:endParaRPr lang="de-DE" dirty="0"/>
-          </a:p>
-        </p:txBody>
-      </p:sp>
     </p:spTree>
     <p:extLst>
       <p:ext uri="{BB962C8B-B14F-4D97-AF65-F5344CB8AC3E}">
@@ -6684,12 +7276,40 @@
           <a:chExt cx="0" cy="0"/>
         </a:xfrm>
       </p:grpSpPr>
+      <p:sp>
+        <p:nvSpPr>
+          <p:cNvPr id="2" name="Titel 1">
+            <a:extLst>
+              <a:ext uri="{FF2B5EF4-FFF2-40B4-BE49-F238E27FC236}">
+                <a16:creationId xmlns:a16="http://schemas.microsoft.com/office/drawing/2014/main" id="{00412780-3B82-C16A-C833-F982FCC104E3}"/>
+              </a:ext>
+            </a:extLst>
+          </p:cNvPr>
+          <p:cNvSpPr>
+            <a:spLocks noGrp="1"/>
+          </p:cNvSpPr>
+          <p:nvPr>
+            <p:ph type="title"/>
+          </p:nvPr>
+        </p:nvSpPr>
+        <p:spPr/>
+        <p:txBody>
+          <a:bodyPr/>
+          <a:lstStyle/>
+          <a:p>
+            <a:r>
+              <a:rPr lang="de-AT" dirty="0"/>
+              <a:t>Data Transformation</a:t>
+            </a:r>
+          </a:p>
+        </p:txBody>
+      </p:sp>
       <p:pic>
         <p:nvPicPr>
           <p:cNvPr id="6" name="Inhaltsplatzhalter 5">
             <a:extLst>
               <a:ext uri="{FF2B5EF4-FFF2-40B4-BE49-F238E27FC236}">
-                <a16:creationId xmlns:a16="http://schemas.microsoft.com/office/drawing/2014/main" id="{FFCF9DD9-C695-410B-0769-319E7862D07A}"/>
+                <a16:creationId xmlns:a16="http://schemas.microsoft.com/office/drawing/2014/main" id="{E5FADF0E-CEF4-0308-EBB5-46559B64D53B}"/>
               </a:ext>
             </a:extLst>
           </p:cNvPr>
@@ -6708,8 +7328,8 @@
         </p:blipFill>
         <p:spPr>
           <a:xfrm>
-            <a:off x="851999" y="1735613"/>
-            <a:ext cx="7440002" cy="4159189"/>
+            <a:off x="794542" y="3214961"/>
+            <a:ext cx="7554915" cy="1727193"/>
           </a:xfrm>
         </p:spPr>
       </p:pic>
@@ -6718,7 +7338,7 @@
           <p:cNvPr id="4" name="Foliennummernplatzhalter 3">
             <a:extLst>
               <a:ext uri="{FF2B5EF4-FFF2-40B4-BE49-F238E27FC236}">
-                <a16:creationId xmlns:a16="http://schemas.microsoft.com/office/drawing/2014/main" id="{75776BB8-D165-478C-281B-FD2528B190BB}"/>
+                <a16:creationId xmlns:a16="http://schemas.microsoft.com/office/drawing/2014/main" id="{7D4EBB18-E29D-01CC-F8EE-8D9D76B75A61}"/>
               </a:ext>
             </a:extLst>
           </p:cNvPr>
@@ -6746,7 +7366,7 @@
     </p:spTree>
     <p:extLst>
       <p:ext uri="{BB962C8B-B14F-4D97-AF65-F5344CB8AC3E}">
-        <p14:creationId xmlns:p14="http://schemas.microsoft.com/office/powerpoint/2010/main" val="346341513"/>
+        <p14:creationId xmlns:p14="http://schemas.microsoft.com/office/powerpoint/2010/main" val="3373916042"/>
       </p:ext>
     </p:extLst>
   </p:cSld>
@@ -6778,7 +7398,7 @@
           <p:cNvPr id="2" name="Titel 1">
             <a:extLst>
               <a:ext uri="{FF2B5EF4-FFF2-40B4-BE49-F238E27FC236}">
-                <a16:creationId xmlns:a16="http://schemas.microsoft.com/office/drawing/2014/main" id="{00412780-3B82-C16A-C833-F982FCC104E3}"/>
+                <a16:creationId xmlns:a16="http://schemas.microsoft.com/office/drawing/2014/main" id="{AB8BCFCA-81B9-C3D9-5280-D20A609083FB}"/>
               </a:ext>
             </a:extLst>
           </p:cNvPr>
@@ -6795,18 +7415,52 @@
           <a:lstStyle/>
           <a:p>
             <a:r>
+              <a:rPr lang="de-AT" dirty="0" err="1"/>
+              <a:t>Predictive</a:t>
+            </a:r>
+            <a:r>
               <a:rPr lang="de-AT" dirty="0"/>
-              <a:t>Data Transformation</a:t>
-            </a:r>
+              <a:t> Modelling</a:t>
+            </a:r>
+          </a:p>
+        </p:txBody>
+      </p:sp>
+      <p:sp>
+        <p:nvSpPr>
+          <p:cNvPr id="4" name="Foliennummernplatzhalter 3">
+            <a:extLst>
+              <a:ext uri="{FF2B5EF4-FFF2-40B4-BE49-F238E27FC236}">
+                <a16:creationId xmlns:a16="http://schemas.microsoft.com/office/drawing/2014/main" id="{52F4B3C6-7627-4B06-F84D-F8F3F94D58B6}"/>
+              </a:ext>
+            </a:extLst>
+          </p:cNvPr>
+          <p:cNvSpPr>
+            <a:spLocks noGrp="1"/>
+          </p:cNvSpPr>
+          <p:nvPr>
+            <p:ph type="sldNum" sz="quarter" idx="12"/>
+          </p:nvPr>
+        </p:nvSpPr>
+        <p:spPr/>
+        <p:txBody>
+          <a:bodyPr/>
+          <a:lstStyle/>
+          <a:p>
+            <a:fld id="{E68C68F6-CEB4-C040-B3A3-CADDD499EB7C}" type="slidenum">
+              <a:rPr lang="de-DE" smtClean="0"/>
+              <a:pPr/>
+              <a:t>8</a:t>
+            </a:fld>
+            <a:endParaRPr lang="de-DE" dirty="0"/>
           </a:p>
         </p:txBody>
       </p:sp>
       <p:pic>
         <p:nvPicPr>
-          <p:cNvPr id="6" name="Inhaltsplatzhalter 5">
+          <p:cNvPr id="8" name="Inhaltsplatzhalter 7">
             <a:extLst>
               <a:ext uri="{FF2B5EF4-FFF2-40B4-BE49-F238E27FC236}">
-                <a16:creationId xmlns:a16="http://schemas.microsoft.com/office/drawing/2014/main" id="{E5FADF0E-CEF4-0308-EBB5-46559B64D53B}"/>
+                <a16:creationId xmlns:a16="http://schemas.microsoft.com/office/drawing/2014/main" id="{9159AA4A-68EF-D2A8-0418-AEACB5502485}"/>
               </a:ext>
             </a:extLst>
           </p:cNvPr>
@@ -6818,52 +7472,23 @@
           </p:nvPr>
         </p:nvPicPr>
         <p:blipFill>
-          <a:blip r:embed="rId2"/>
+          <a:blip r:embed="rId3"/>
+          <a:srcRect l="1467" t="1886"/>
           <a:stretch>
             <a:fillRect/>
           </a:stretch>
         </p:blipFill>
         <p:spPr>
           <a:xfrm>
-            <a:off x="794542" y="3214961"/>
-            <a:ext cx="7554915" cy="1727193"/>
+            <a:off x="2191643" y="2511381"/>
+            <a:ext cx="4408780" cy="3324216"/>
           </a:xfrm>
         </p:spPr>
       </p:pic>
-      <p:sp>
-        <p:nvSpPr>
-          <p:cNvPr id="4" name="Foliennummernplatzhalter 3">
-            <a:extLst>
-              <a:ext uri="{FF2B5EF4-FFF2-40B4-BE49-F238E27FC236}">
-                <a16:creationId xmlns:a16="http://schemas.microsoft.com/office/drawing/2014/main" id="{7D4EBB18-E29D-01CC-F8EE-8D9D76B75A61}"/>
-              </a:ext>
-            </a:extLst>
-          </p:cNvPr>
-          <p:cNvSpPr>
-            <a:spLocks noGrp="1"/>
-          </p:cNvSpPr>
-          <p:nvPr>
-            <p:ph type="sldNum" sz="quarter" idx="12"/>
-          </p:nvPr>
-        </p:nvSpPr>
-        <p:spPr/>
-        <p:txBody>
-          <a:bodyPr/>
-          <a:lstStyle/>
-          <a:p>
-            <a:fld id="{E68C68F6-CEB4-C040-B3A3-CADDD499EB7C}" type="slidenum">
-              <a:rPr lang="de-DE" smtClean="0"/>
-              <a:pPr/>
-              <a:t>8</a:t>
-            </a:fld>
-            <a:endParaRPr lang="de-DE" dirty="0"/>
-          </a:p>
-        </p:txBody>
-      </p:sp>
     </p:spTree>
     <p:extLst>
       <p:ext uri="{BB962C8B-B14F-4D97-AF65-F5344CB8AC3E}">
-        <p14:creationId xmlns:p14="http://schemas.microsoft.com/office/powerpoint/2010/main" val="3373916042"/>
+        <p14:creationId xmlns:p14="http://schemas.microsoft.com/office/powerpoint/2010/main" val="263955577"/>
       </p:ext>
     </p:extLst>
   </p:cSld>
@@ -6890,44 +7515,12 @@
           <a:chExt cx="0" cy="0"/>
         </a:xfrm>
       </p:grpSpPr>
-      <p:sp>
-        <p:nvSpPr>
-          <p:cNvPr id="2" name="Titel 1">
-            <a:extLst>
-              <a:ext uri="{FF2B5EF4-FFF2-40B4-BE49-F238E27FC236}">
-                <a16:creationId xmlns:a16="http://schemas.microsoft.com/office/drawing/2014/main" id="{AB8BCFCA-81B9-C3D9-5280-D20A609083FB}"/>
-              </a:ext>
-            </a:extLst>
-          </p:cNvPr>
-          <p:cNvSpPr>
-            <a:spLocks noGrp="1"/>
-          </p:cNvSpPr>
-          <p:nvPr>
-            <p:ph type="title"/>
-          </p:nvPr>
-        </p:nvSpPr>
-        <p:spPr/>
-        <p:txBody>
-          <a:bodyPr/>
-          <a:lstStyle/>
-          <a:p>
-            <a:r>
-              <a:rPr lang="de-AT" dirty="0" err="1"/>
-              <a:t>Predictive</a:t>
-            </a:r>
-            <a:r>
-              <a:rPr lang="de-AT" dirty="0"/>
-              <a:t> Modelling</a:t>
-            </a:r>
-          </a:p>
-        </p:txBody>
-      </p:sp>
       <p:pic>
         <p:nvPicPr>
           <p:cNvPr id="6" name="Inhaltsplatzhalter 5">
             <a:extLst>
               <a:ext uri="{FF2B5EF4-FFF2-40B4-BE49-F238E27FC236}">
-                <a16:creationId xmlns:a16="http://schemas.microsoft.com/office/drawing/2014/main" id="{DAC834EA-85C8-D559-D03D-45A3E96729D9}"/>
+                <a16:creationId xmlns:a16="http://schemas.microsoft.com/office/drawing/2014/main" id="{A9ACD8A0-5D64-1B3D-C75E-6F213D44E1AA}"/>
               </a:ext>
             </a:extLst>
           </p:cNvPr>
@@ -6946,8 +7539,8 @@
         </p:blipFill>
         <p:spPr>
           <a:xfrm>
-            <a:off x="1045946" y="2845674"/>
-            <a:ext cx="7052108" cy="3001827"/>
+            <a:off x="1253394" y="1708241"/>
+            <a:ext cx="6637212" cy="3441518"/>
           </a:xfrm>
         </p:spPr>
       </p:pic>
@@ -6956,7 +7549,7 @@
           <p:cNvPr id="4" name="Foliennummernplatzhalter 3">
             <a:extLst>
               <a:ext uri="{FF2B5EF4-FFF2-40B4-BE49-F238E27FC236}">
-                <a16:creationId xmlns:a16="http://schemas.microsoft.com/office/drawing/2014/main" id="{52F4B3C6-7627-4B06-F84D-F8F3F94D58B6}"/>
+                <a16:creationId xmlns:a16="http://schemas.microsoft.com/office/drawing/2014/main" id="{51A2DE25-317D-0799-9020-0FCA398BE531}"/>
               </a:ext>
             </a:extLst>
           </p:cNvPr>
@@ -6984,7 +7577,7 @@
     </p:spTree>
     <p:extLst>
       <p:ext uri="{BB962C8B-B14F-4D97-AF65-F5344CB8AC3E}">
-        <p14:creationId xmlns:p14="http://schemas.microsoft.com/office/powerpoint/2010/main" val="263955577"/>
+        <p14:creationId xmlns:p14="http://schemas.microsoft.com/office/powerpoint/2010/main" val="3319517710"/>
       </p:ext>
     </p:extLst>
   </p:cSld>

</xml_diff>